<commit_message>
Update 2021-09-06 brng_stoc_snn.py 발표자료.pptx
</commit_message>
<xml_diff>
--- a/발표 자료/2021-09-06 brng_stoc_snn.py 발표자료.pptx
+++ b/발표 자료/2021-09-06 brng_stoc_snn.py 발표자료.pptx
@@ -24,16 +24,10 @@
     <p:sldId id="290" r:id="rId18"/>
     <p:sldId id="291" r:id="rId19"/>
     <p:sldId id="292" r:id="rId20"/>
-    <p:sldId id="293" r:id="rId21"/>
-    <p:sldId id="294" r:id="rId22"/>
-    <p:sldId id="295" r:id="rId23"/>
-    <p:sldId id="296" r:id="rId24"/>
-    <p:sldId id="297" r:id="rId25"/>
-    <p:sldId id="268" r:id="rId26"/>
-    <p:sldId id="271" r:id="rId27"/>
-    <p:sldId id="272" r:id="rId28"/>
-    <p:sldId id="274" r:id="rId29"/>
-    <p:sldId id="269" r:id="rId30"/>
+    <p:sldId id="298" r:id="rId21"/>
+    <p:sldId id="293" r:id="rId22"/>
+    <p:sldId id="299" r:id="rId23"/>
+    <p:sldId id="297" r:id="rId24"/>
   </p:sldIdLst>
   <p:sldSz cx="12192000" cy="6858000"/>
   <p:notesSz cx="6858000" cy="9144000"/>
@@ -885,7 +879,7 @@
           <a:p>
             <a:fld id="{0DEEF2AD-A5B8-4881-A716-76B85BBF1017}" type="datetimeFigureOut">
               <a:rPr lang="ko-KR" altLang="en-US" smtClean="0"/>
-              <a:t>2021-09-06</a:t>
+              <a:t>2021-09-09</a:t>
             </a:fld>
             <a:endParaRPr lang="ko-KR" altLang="en-US"/>
           </a:p>
@@ -1136,7 +1130,7 @@
           <a:p>
             <a:fld id="{0DEEF2AD-A5B8-4881-A716-76B85BBF1017}" type="datetimeFigureOut">
               <a:rPr lang="ko-KR" altLang="en-US" smtClean="0"/>
-              <a:t>2021-09-06</a:t>
+              <a:t>2021-09-09</a:t>
             </a:fld>
             <a:endParaRPr lang="ko-KR" altLang="en-US"/>
           </a:p>
@@ -1450,7 +1444,7 @@
           <a:p>
             <a:fld id="{0DEEF2AD-A5B8-4881-A716-76B85BBF1017}" type="datetimeFigureOut">
               <a:rPr lang="ko-KR" altLang="en-US" smtClean="0"/>
-              <a:t>2021-09-06</a:t>
+              <a:t>2021-09-09</a:t>
             </a:fld>
             <a:endParaRPr lang="ko-KR" altLang="en-US"/>
           </a:p>
@@ -1783,7 +1777,7 @@
           <a:p>
             <a:fld id="{0DEEF2AD-A5B8-4881-A716-76B85BBF1017}" type="datetimeFigureOut">
               <a:rPr lang="ko-KR" altLang="en-US" smtClean="0"/>
-              <a:t>2021-09-06</a:t>
+              <a:t>2021-09-09</a:t>
             </a:fld>
             <a:endParaRPr lang="ko-KR" altLang="en-US"/>
           </a:p>
@@ -2097,7 +2091,7 @@
           <a:p>
             <a:fld id="{0DEEF2AD-A5B8-4881-A716-76B85BBF1017}" type="datetimeFigureOut">
               <a:rPr lang="ko-KR" altLang="en-US" smtClean="0"/>
-              <a:t>2021-09-06</a:t>
+              <a:t>2021-09-09</a:t>
             </a:fld>
             <a:endParaRPr lang="ko-KR" altLang="en-US"/>
           </a:p>
@@ -2490,7 +2484,7 @@
           <a:p>
             <a:fld id="{0DEEF2AD-A5B8-4881-A716-76B85BBF1017}" type="datetimeFigureOut">
               <a:rPr lang="ko-KR" altLang="en-US" smtClean="0"/>
-              <a:t>2021-09-06</a:t>
+              <a:t>2021-09-09</a:t>
             </a:fld>
             <a:endParaRPr lang="ko-KR" altLang="en-US"/>
           </a:p>
@@ -2660,7 +2654,7 @@
           <a:p>
             <a:fld id="{0DEEF2AD-A5B8-4881-A716-76B85BBF1017}" type="datetimeFigureOut">
               <a:rPr lang="ko-KR" altLang="en-US" smtClean="0"/>
-              <a:t>2021-09-06</a:t>
+              <a:t>2021-09-09</a:t>
             </a:fld>
             <a:endParaRPr lang="ko-KR" altLang="en-US"/>
           </a:p>
@@ -2840,7 +2834,7 @@
           <a:p>
             <a:fld id="{0DEEF2AD-A5B8-4881-A716-76B85BBF1017}" type="datetimeFigureOut">
               <a:rPr lang="ko-KR" altLang="en-US" smtClean="0"/>
-              <a:t>2021-09-06</a:t>
+              <a:t>2021-09-09</a:t>
             </a:fld>
             <a:endParaRPr lang="ko-KR" altLang="en-US"/>
           </a:p>
@@ -3010,7 +3004,7 @@
           <a:p>
             <a:fld id="{0DEEF2AD-A5B8-4881-A716-76B85BBF1017}" type="datetimeFigureOut">
               <a:rPr lang="ko-KR" altLang="en-US" smtClean="0"/>
-              <a:t>2021-09-06</a:t>
+              <a:t>2021-09-09</a:t>
             </a:fld>
             <a:endParaRPr lang="ko-KR" altLang="en-US"/>
           </a:p>
@@ -3257,7 +3251,7 @@
           <a:p>
             <a:fld id="{0DEEF2AD-A5B8-4881-A716-76B85BBF1017}" type="datetimeFigureOut">
               <a:rPr lang="ko-KR" altLang="en-US" smtClean="0"/>
-              <a:t>2021-09-06</a:t>
+              <a:t>2021-09-09</a:t>
             </a:fld>
             <a:endParaRPr lang="ko-KR" altLang="en-US"/>
           </a:p>
@@ -3489,7 +3483,7 @@
           <a:p>
             <a:fld id="{0DEEF2AD-A5B8-4881-A716-76B85BBF1017}" type="datetimeFigureOut">
               <a:rPr lang="ko-KR" altLang="en-US" smtClean="0"/>
-              <a:t>2021-09-06</a:t>
+              <a:t>2021-09-09</a:t>
             </a:fld>
             <a:endParaRPr lang="ko-KR" altLang="en-US"/>
           </a:p>
@@ -3863,7 +3857,7 @@
           <a:p>
             <a:fld id="{0DEEF2AD-A5B8-4881-A716-76B85BBF1017}" type="datetimeFigureOut">
               <a:rPr lang="ko-KR" altLang="en-US" smtClean="0"/>
-              <a:t>2021-09-06</a:t>
+              <a:t>2021-09-09</a:t>
             </a:fld>
             <a:endParaRPr lang="ko-KR" altLang="en-US"/>
           </a:p>
@@ -3986,7 +3980,7 @@
           <a:p>
             <a:fld id="{0DEEF2AD-A5B8-4881-A716-76B85BBF1017}" type="datetimeFigureOut">
               <a:rPr lang="ko-KR" altLang="en-US" smtClean="0"/>
-              <a:t>2021-09-06</a:t>
+              <a:t>2021-09-09</a:t>
             </a:fld>
             <a:endParaRPr lang="ko-KR" altLang="en-US"/>
           </a:p>
@@ -4081,7 +4075,7 @@
           <a:p>
             <a:fld id="{0DEEF2AD-A5B8-4881-A716-76B85BBF1017}" type="datetimeFigureOut">
               <a:rPr lang="ko-KR" altLang="en-US" smtClean="0"/>
-              <a:t>2021-09-06</a:t>
+              <a:t>2021-09-09</a:t>
             </a:fld>
             <a:endParaRPr lang="ko-KR" altLang="en-US"/>
           </a:p>
@@ -4336,7 +4330,7 @@
           <a:p>
             <a:fld id="{0DEEF2AD-A5B8-4881-A716-76B85BBF1017}" type="datetimeFigureOut">
               <a:rPr lang="ko-KR" altLang="en-US" smtClean="0"/>
-              <a:t>2021-09-06</a:t>
+              <a:t>2021-09-09</a:t>
             </a:fld>
             <a:endParaRPr lang="ko-KR" altLang="en-US"/>
           </a:p>
@@ -4641,7 +4635,7 @@
           <a:p>
             <a:fld id="{0DEEF2AD-A5B8-4881-A716-76B85BBF1017}" type="datetimeFigureOut">
               <a:rPr lang="ko-KR" altLang="en-US" smtClean="0"/>
-              <a:t>2021-09-06</a:t>
+              <a:t>2021-09-09</a:t>
             </a:fld>
             <a:endParaRPr lang="ko-KR" altLang="en-US"/>
           </a:p>
@@ -5343,7 +5337,7 @@
           <a:p>
             <a:fld id="{0DEEF2AD-A5B8-4881-A716-76B85BBF1017}" type="datetimeFigureOut">
               <a:rPr lang="ko-KR" altLang="en-US" smtClean="0"/>
-              <a:t>2021-09-06</a:t>
+              <a:t>2021-09-09</a:t>
             </a:fld>
             <a:endParaRPr lang="ko-KR" altLang="en-US"/>
           </a:p>
@@ -5881,7 +5875,7 @@
         </p:nvSpPr>
         <p:spPr>
           <a:xfrm>
-            <a:off x="4576104" y="3167390"/>
+            <a:off x="4576104" y="2905780"/>
             <a:ext cx="3039791" cy="523220"/>
           </a:xfrm>
           <a:prstGeom prst="rect">
@@ -6929,7 +6923,7 @@
         </p:blipFill>
         <p:spPr>
           <a:xfrm>
-            <a:off x="624114" y="2056047"/>
+            <a:off x="624114" y="2272986"/>
             <a:ext cx="11285002" cy="1372953"/>
           </a:xfrm>
           <a:prstGeom prst="rect">
@@ -6961,6 +6955,36 @@
           <a:xfrm>
             <a:off x="3838260" y="855390"/>
             <a:ext cx="4515480" cy="647790"/>
+          </a:xfrm>
+          <a:prstGeom prst="rect">
+            <a:avLst/>
+          </a:prstGeom>
+        </p:spPr>
+      </p:pic>
+      <p:pic>
+        <p:nvPicPr>
+          <p:cNvPr id="3" name="그림 2">
+            <a:extLst>
+              <a:ext uri="{FF2B5EF4-FFF2-40B4-BE49-F238E27FC236}">
+                <a16:creationId xmlns:a16="http://schemas.microsoft.com/office/drawing/2014/main" id="{0AA8AC20-4B89-476D-B022-62607448FCB1}"/>
+              </a:ext>
+            </a:extLst>
+          </p:cNvPr>
+          <p:cNvPicPr>
+            <a:picLocks noChangeAspect="1"/>
+          </p:cNvPicPr>
+          <p:nvPr/>
+        </p:nvPicPr>
+        <p:blipFill>
+          <a:blip r:embed="rId4"/>
+          <a:stretch>
+            <a:fillRect/>
+          </a:stretch>
+        </p:blipFill>
+        <p:spPr>
+          <a:xfrm>
+            <a:off x="3619154" y="4415745"/>
+            <a:ext cx="4734586" cy="647790"/>
           </a:xfrm>
           <a:prstGeom prst="rect">
             <a:avLst/>
@@ -6997,6 +7021,36 @@
           <a:chExt cx="0" cy="0"/>
         </a:xfrm>
       </p:grpSpPr>
+      <p:pic>
+        <p:nvPicPr>
+          <p:cNvPr id="3" name="그림 2">
+            <a:extLst>
+              <a:ext uri="{FF2B5EF4-FFF2-40B4-BE49-F238E27FC236}">
+                <a16:creationId xmlns:a16="http://schemas.microsoft.com/office/drawing/2014/main" id="{604D64BD-C17C-4C13-8D6A-98AE3B4F31D8}"/>
+              </a:ext>
+            </a:extLst>
+          </p:cNvPr>
+          <p:cNvPicPr>
+            <a:picLocks noChangeAspect="1"/>
+          </p:cNvPicPr>
+          <p:nvPr/>
+        </p:nvPicPr>
+        <p:blipFill>
+          <a:blip r:embed="rId2"/>
+          <a:stretch>
+            <a:fillRect/>
+          </a:stretch>
+        </p:blipFill>
+        <p:spPr>
+          <a:xfrm>
+            <a:off x="435193" y="654210"/>
+            <a:ext cx="11321613" cy="5549580"/>
+          </a:xfrm>
+          <a:prstGeom prst="rect">
+            <a:avLst/>
+          </a:prstGeom>
+        </p:spPr>
+      </p:pic>
     </p:spTree>
     <p:extLst>
       <p:ext uri="{BB962C8B-B14F-4D97-AF65-F5344CB8AC3E}">
@@ -7117,10 +7171,40 @@
           <a:chExt cx="0" cy="0"/>
         </a:xfrm>
       </p:grpSpPr>
+      <p:pic>
+        <p:nvPicPr>
+          <p:cNvPr id="4" name="그림 3">
+            <a:extLst>
+              <a:ext uri="{FF2B5EF4-FFF2-40B4-BE49-F238E27FC236}">
+                <a16:creationId xmlns:a16="http://schemas.microsoft.com/office/drawing/2014/main" id="{8612F0D6-D5B2-46EC-B5C3-8179636F3AC7}"/>
+              </a:ext>
+            </a:extLst>
+          </p:cNvPr>
+          <p:cNvPicPr>
+            <a:picLocks noChangeAspect="1"/>
+          </p:cNvPicPr>
+          <p:nvPr/>
+        </p:nvPicPr>
+        <p:blipFill>
+          <a:blip r:embed="rId2"/>
+          <a:stretch>
+            <a:fillRect/>
+          </a:stretch>
+        </p:blipFill>
+        <p:spPr>
+          <a:xfrm>
+            <a:off x="987988" y="867508"/>
+            <a:ext cx="10216024" cy="4685451"/>
+          </a:xfrm>
+          <a:prstGeom prst="rect">
+            <a:avLst/>
+          </a:prstGeom>
+        </p:spPr>
+      </p:pic>
     </p:spTree>
     <p:extLst>
       <p:ext uri="{BB962C8B-B14F-4D97-AF65-F5344CB8AC3E}">
-        <p14:creationId xmlns:p14="http://schemas.microsoft.com/office/powerpoint/2010/main" val="1493293366"/>
+        <p14:creationId xmlns:p14="http://schemas.microsoft.com/office/powerpoint/2010/main" val="312424268"/>
       </p:ext>
     </p:extLst>
   </p:cSld>
@@ -7147,10 +7231,70 @@
           <a:chExt cx="0" cy="0"/>
         </a:xfrm>
       </p:grpSpPr>
+      <p:pic>
+        <p:nvPicPr>
+          <p:cNvPr id="3" name="그림 2">
+            <a:extLst>
+              <a:ext uri="{FF2B5EF4-FFF2-40B4-BE49-F238E27FC236}">
+                <a16:creationId xmlns:a16="http://schemas.microsoft.com/office/drawing/2014/main" id="{663E8AB2-DF58-4A73-B80B-5586803F227B}"/>
+              </a:ext>
+            </a:extLst>
+          </p:cNvPr>
+          <p:cNvPicPr>
+            <a:picLocks noChangeAspect="1"/>
+          </p:cNvPicPr>
+          <p:nvPr/>
+        </p:nvPicPr>
+        <p:blipFill>
+          <a:blip r:embed="rId2"/>
+          <a:stretch>
+            <a:fillRect/>
+          </a:stretch>
+        </p:blipFill>
+        <p:spPr>
+          <a:xfrm>
+            <a:off x="0" y="588901"/>
+            <a:ext cx="12192000" cy="4095237"/>
+          </a:xfrm>
+          <a:prstGeom prst="rect">
+            <a:avLst/>
+          </a:prstGeom>
+        </p:spPr>
+      </p:pic>
+      <p:pic>
+        <p:nvPicPr>
+          <p:cNvPr id="5" name="그림 4">
+            <a:extLst>
+              <a:ext uri="{FF2B5EF4-FFF2-40B4-BE49-F238E27FC236}">
+                <a16:creationId xmlns:a16="http://schemas.microsoft.com/office/drawing/2014/main" id="{6BBEABE8-017F-4000-B2B0-857F6ECC5FD2}"/>
+              </a:ext>
+            </a:extLst>
+          </p:cNvPr>
+          <p:cNvPicPr>
+            <a:picLocks noChangeAspect="1"/>
+          </p:cNvPicPr>
+          <p:nvPr/>
+        </p:nvPicPr>
+        <p:blipFill>
+          <a:blip r:embed="rId3"/>
+          <a:stretch>
+            <a:fillRect/>
+          </a:stretch>
+        </p:blipFill>
+        <p:spPr>
+          <a:xfrm>
+            <a:off x="0" y="5047244"/>
+            <a:ext cx="12192000" cy="1000231"/>
+          </a:xfrm>
+          <a:prstGeom prst="rect">
+            <a:avLst/>
+          </a:prstGeom>
+        </p:spPr>
+      </p:pic>
     </p:spTree>
     <p:extLst>
       <p:ext uri="{BB962C8B-B14F-4D97-AF65-F5344CB8AC3E}">
-        <p14:creationId xmlns:p14="http://schemas.microsoft.com/office/powerpoint/2010/main" val="920601473"/>
+        <p14:creationId xmlns:p14="http://schemas.microsoft.com/office/powerpoint/2010/main" val="1493293366"/>
       </p:ext>
     </p:extLst>
   </p:cSld>
@@ -7177,10 +7321,40 @@
           <a:chExt cx="0" cy="0"/>
         </a:xfrm>
       </p:grpSpPr>
+      <p:pic>
+        <p:nvPicPr>
+          <p:cNvPr id="3" name="그림 2">
+            <a:extLst>
+              <a:ext uri="{FF2B5EF4-FFF2-40B4-BE49-F238E27FC236}">
+                <a16:creationId xmlns:a16="http://schemas.microsoft.com/office/drawing/2014/main" id="{88F10948-487B-4125-A4C4-040642DC450C}"/>
+              </a:ext>
+            </a:extLst>
+          </p:cNvPr>
+          <p:cNvPicPr>
+            <a:picLocks noChangeAspect="1"/>
+          </p:cNvPicPr>
+          <p:nvPr/>
+        </p:nvPicPr>
+        <p:blipFill>
+          <a:blip r:embed="rId2"/>
+          <a:stretch>
+            <a:fillRect/>
+          </a:stretch>
+        </p:blipFill>
+        <p:spPr>
+          <a:xfrm>
+            <a:off x="498741" y="2179736"/>
+            <a:ext cx="11194517" cy="2498527"/>
+          </a:xfrm>
+          <a:prstGeom prst="rect">
+            <a:avLst/>
+          </a:prstGeom>
+        </p:spPr>
+      </p:pic>
     </p:spTree>
     <p:extLst>
       <p:ext uri="{BB962C8B-B14F-4D97-AF65-F5344CB8AC3E}">
-        <p14:creationId xmlns:p14="http://schemas.microsoft.com/office/powerpoint/2010/main" val="2815579497"/>
+        <p14:creationId xmlns:p14="http://schemas.microsoft.com/office/powerpoint/2010/main" val="2876051229"/>
       </p:ext>
     </p:extLst>
   </p:cSld>
@@ -7210,512 +7384,7 @@
     </p:spTree>
     <p:extLst>
       <p:ext uri="{BB962C8B-B14F-4D97-AF65-F5344CB8AC3E}">
-        <p14:creationId xmlns:p14="http://schemas.microsoft.com/office/powerpoint/2010/main" val="505438191"/>
-      </p:ext>
-    </p:extLst>
-  </p:cSld>
-  <p:clrMapOvr>
-    <a:masterClrMapping/>
-  </p:clrMapOvr>
-</p:sld>
-</file>
-
-<file path=ppt/slides/slide24.xml><?xml version="1.0" encoding="utf-8"?>
-<p:sld xmlns:a="http://schemas.openxmlformats.org/drawingml/2006/main" xmlns:r="http://schemas.openxmlformats.org/officeDocument/2006/relationships" xmlns:p="http://schemas.openxmlformats.org/presentationml/2006/main">
-  <p:cSld>
-    <p:spTree>
-      <p:nvGrpSpPr>
-        <p:cNvPr id="1" name=""/>
-        <p:cNvGrpSpPr/>
-        <p:nvPr/>
-      </p:nvGrpSpPr>
-      <p:grpSpPr>
-        <a:xfrm>
-          <a:off x="0" y="0"/>
-          <a:ext cx="0" cy="0"/>
-          <a:chOff x="0" y="0"/>
-          <a:chExt cx="0" cy="0"/>
-        </a:xfrm>
-      </p:grpSpPr>
-    </p:spTree>
-    <p:extLst>
-      <p:ext uri="{BB962C8B-B14F-4D97-AF65-F5344CB8AC3E}">
         <p14:creationId xmlns:p14="http://schemas.microsoft.com/office/powerpoint/2010/main" val="968878870"/>
-      </p:ext>
-    </p:extLst>
-  </p:cSld>
-  <p:clrMapOvr>
-    <a:masterClrMapping/>
-  </p:clrMapOvr>
-</p:sld>
-</file>
-
-<file path=ppt/slides/slide25.xml><?xml version="1.0" encoding="utf-8"?>
-<p:sld xmlns:a="http://schemas.openxmlformats.org/drawingml/2006/main" xmlns:r="http://schemas.openxmlformats.org/officeDocument/2006/relationships" xmlns:p="http://schemas.openxmlformats.org/presentationml/2006/main">
-  <p:cSld>
-    <p:spTree>
-      <p:nvGrpSpPr>
-        <p:cNvPr id="1" name=""/>
-        <p:cNvGrpSpPr/>
-        <p:nvPr/>
-      </p:nvGrpSpPr>
-      <p:grpSpPr>
-        <a:xfrm>
-          <a:off x="0" y="0"/>
-          <a:ext cx="0" cy="0"/>
-          <a:chOff x="0" y="0"/>
-          <a:chExt cx="0" cy="0"/>
-        </a:xfrm>
-      </p:grpSpPr>
-      <p:pic>
-        <p:nvPicPr>
-          <p:cNvPr id="9" name="그림 8">
-            <a:extLst>
-              <a:ext uri="{FF2B5EF4-FFF2-40B4-BE49-F238E27FC236}">
-                <a16:creationId xmlns:a16="http://schemas.microsoft.com/office/drawing/2014/main" id="{1F854B12-FCAA-4308-9B54-38395461D3BF}"/>
-              </a:ext>
-            </a:extLst>
-          </p:cNvPr>
-          <p:cNvPicPr>
-            <a:picLocks noChangeAspect="1"/>
-          </p:cNvPicPr>
-          <p:nvPr/>
-        </p:nvPicPr>
-        <p:blipFill>
-          <a:blip r:embed="rId2"/>
-          <a:stretch>
-            <a:fillRect/>
-          </a:stretch>
-        </p:blipFill>
-        <p:spPr>
-          <a:xfrm>
-            <a:off x="1193477" y="605009"/>
-            <a:ext cx="9805045" cy="1977770"/>
-          </a:xfrm>
-          <a:prstGeom prst="rect">
-            <a:avLst/>
-          </a:prstGeom>
-        </p:spPr>
-      </p:pic>
-      <p:sp>
-        <p:nvSpPr>
-          <p:cNvPr id="10" name="TextBox 9">
-            <a:extLst>
-              <a:ext uri="{FF2B5EF4-FFF2-40B4-BE49-F238E27FC236}">
-                <a16:creationId xmlns:a16="http://schemas.microsoft.com/office/drawing/2014/main" id="{952C2A06-E912-46AD-A3CC-B9F3DAEB1E44}"/>
-              </a:ext>
-            </a:extLst>
-          </p:cNvPr>
-          <p:cNvSpPr txBox="1"/>
-          <p:nvPr/>
-        </p:nvSpPr>
-        <p:spPr>
-          <a:xfrm>
-            <a:off x="2612210" y="3598664"/>
-            <a:ext cx="6967577" cy="646331"/>
-          </a:xfrm>
-          <a:prstGeom prst="rect">
-            <a:avLst/>
-          </a:prstGeom>
-          <a:noFill/>
-        </p:spPr>
-        <p:txBody>
-          <a:bodyPr wrap="square" rtlCol="0">
-            <a:spAutoFit/>
-          </a:bodyPr>
-          <a:lstStyle/>
-          <a:p>
-            <a:r>
-              <a:rPr lang="de-DE" altLang="ko-KR" sz="1800" b="0" i="0" u="none" strike="noStrike" baseline="0" dirty="0">
-                <a:solidFill>
-                  <a:srgbClr val="000000"/>
-                </a:solidFill>
-                <a:latin typeface="Courier10 BT" pitchFamily="2" charset="0"/>
-              </a:rPr>
-              <a:t> 10x340       784x10   	      784x340    1x10  </a:t>
-            </a:r>
-          </a:p>
-          <a:p>
-            <a:r>
-              <a:rPr lang="de-DE" altLang="ko-KR" sz="1800" b="0" i="0" u="none" strike="noStrike" baseline="0" dirty="0">
-                <a:solidFill>
-                  <a:srgbClr val="000000"/>
-                </a:solidFill>
-                <a:latin typeface="Courier10 BT" pitchFamily="2" charset="0"/>
-              </a:rPr>
-              <a:t>u(j, t+1) = weights_e(:, j)'*EPSP(:, t) - I(j)</a:t>
-            </a:r>
-          </a:p>
-        </p:txBody>
-      </p:sp>
-      <p:sp>
-        <p:nvSpPr>
-          <p:cNvPr id="12" name="TextBox 11">
-            <a:extLst>
-              <a:ext uri="{FF2B5EF4-FFF2-40B4-BE49-F238E27FC236}">
-                <a16:creationId xmlns:a16="http://schemas.microsoft.com/office/drawing/2014/main" id="{683AFA37-818E-4BD1-AE2C-C36BA951CF52}"/>
-              </a:ext>
-            </a:extLst>
-          </p:cNvPr>
-          <p:cNvSpPr txBox="1"/>
-          <p:nvPr/>
-        </p:nvSpPr>
-        <p:spPr>
-          <a:xfrm>
-            <a:off x="2718008" y="4751582"/>
-            <a:ext cx="6755979" cy="646331"/>
-          </a:xfrm>
-          <a:prstGeom prst="rect">
-            <a:avLst/>
-          </a:prstGeom>
-          <a:noFill/>
-        </p:spPr>
-        <p:txBody>
-          <a:bodyPr wrap="square" rtlCol="0">
-            <a:spAutoFit/>
-          </a:bodyPr>
-          <a:lstStyle/>
-          <a:p>
-            <a:r>
-              <a:rPr lang="de-DE" altLang="ko-KR" sz="1800" b="0" i="0" u="none" strike="noStrike" baseline="0" dirty="0">
-                <a:solidFill>
-                  <a:srgbClr val="000000"/>
-                </a:solidFill>
-                <a:latin typeface="Courier10 BT" pitchFamily="2" charset="0"/>
-              </a:rPr>
-              <a:t> 1x1        784x1 -&gt; 1x784		784x1       1x1</a:t>
-            </a:r>
-          </a:p>
-          <a:p>
-            <a:r>
-              <a:rPr lang="de-DE" altLang="ko-KR" sz="1800" b="0" i="0" u="none" strike="noStrike" baseline="0" dirty="0">
-                <a:solidFill>
-                  <a:srgbClr val="000000"/>
-                </a:solidFill>
-                <a:latin typeface="Courier10 BT" pitchFamily="2" charset="0"/>
-              </a:rPr>
-              <a:t>u(j, t+1) = weights_e(:, j)'*EPSP(:, t) ) - I(j)</a:t>
-            </a:r>
-            <a:endParaRPr lang="ko-KR" altLang="en-US" dirty="0"/>
-          </a:p>
-        </p:txBody>
-      </p:sp>
-      <p:cxnSp>
-        <p:nvCxnSpPr>
-          <p:cNvPr id="14" name="직선 화살표 연결선 13">
-            <a:extLst>
-              <a:ext uri="{FF2B5EF4-FFF2-40B4-BE49-F238E27FC236}">
-                <a16:creationId xmlns:a16="http://schemas.microsoft.com/office/drawing/2014/main" id="{9F7EA1CE-2272-47FE-BB0A-BF7BCFF5B8F7}"/>
-              </a:ext>
-            </a:extLst>
-          </p:cNvPr>
-          <p:cNvCxnSpPr>
-            <a:stCxn id="10" idx="2"/>
-            <a:endCxn id="12" idx="0"/>
-          </p:cNvCxnSpPr>
-          <p:nvPr/>
-        </p:nvCxnSpPr>
-        <p:spPr>
-          <a:xfrm flipH="1">
-            <a:off x="6095998" y="4244995"/>
-            <a:ext cx="1" cy="506587"/>
-          </a:xfrm>
-          <a:prstGeom prst="straightConnector1">
-            <a:avLst/>
-          </a:prstGeom>
-          <a:ln w="38100">
-            <a:tailEnd type="triangle"/>
-          </a:ln>
-        </p:spPr>
-        <p:style>
-          <a:lnRef idx="1">
-            <a:schemeClr val="accent1"/>
-          </a:lnRef>
-          <a:fillRef idx="0">
-            <a:schemeClr val="accent1"/>
-          </a:fillRef>
-          <a:effectRef idx="0">
-            <a:schemeClr val="accent1"/>
-          </a:effectRef>
-          <a:fontRef idx="minor">
-            <a:schemeClr val="tx1"/>
-          </a:fontRef>
-        </p:style>
-      </p:cxnSp>
-    </p:spTree>
-    <p:extLst>
-      <p:ext uri="{BB962C8B-B14F-4D97-AF65-F5344CB8AC3E}">
-        <p14:creationId xmlns:p14="http://schemas.microsoft.com/office/powerpoint/2010/main" val="1360478547"/>
-      </p:ext>
-    </p:extLst>
-  </p:cSld>
-  <p:clrMapOvr>
-    <a:masterClrMapping/>
-  </p:clrMapOvr>
-</p:sld>
-</file>
-
-<file path=ppt/slides/slide26.xml><?xml version="1.0" encoding="utf-8"?>
-<p:sld xmlns:a="http://schemas.openxmlformats.org/drawingml/2006/main" xmlns:r="http://schemas.openxmlformats.org/officeDocument/2006/relationships" xmlns:p="http://schemas.openxmlformats.org/presentationml/2006/main">
-  <p:cSld>
-    <p:spTree>
-      <p:nvGrpSpPr>
-        <p:cNvPr id="1" name=""/>
-        <p:cNvGrpSpPr/>
-        <p:nvPr/>
-      </p:nvGrpSpPr>
-      <p:grpSpPr>
-        <a:xfrm>
-          <a:off x="0" y="0"/>
-          <a:ext cx="0" cy="0"/>
-          <a:chOff x="0" y="0"/>
-          <a:chExt cx="0" cy="0"/>
-        </a:xfrm>
-      </p:grpSpPr>
-      <p:pic>
-        <p:nvPicPr>
-          <p:cNvPr id="6" name="그림 5">
-            <a:extLst>
-              <a:ext uri="{FF2B5EF4-FFF2-40B4-BE49-F238E27FC236}">
-                <a16:creationId xmlns:a16="http://schemas.microsoft.com/office/drawing/2014/main" id="{1144485D-1EFA-48D5-89B2-28C3187C1A86}"/>
-              </a:ext>
-            </a:extLst>
-          </p:cNvPr>
-          <p:cNvPicPr>
-            <a:picLocks noChangeAspect="1"/>
-          </p:cNvPicPr>
-          <p:nvPr/>
-        </p:nvPicPr>
-        <p:blipFill>
-          <a:blip r:embed="rId2"/>
-          <a:stretch>
-            <a:fillRect/>
-          </a:stretch>
-        </p:blipFill>
-        <p:spPr>
-          <a:xfrm>
-            <a:off x="1428798" y="1503952"/>
-            <a:ext cx="9334404" cy="3850096"/>
-          </a:xfrm>
-          <a:prstGeom prst="rect">
-            <a:avLst/>
-          </a:prstGeom>
-        </p:spPr>
-      </p:pic>
-    </p:spTree>
-    <p:extLst>
-      <p:ext uri="{BB962C8B-B14F-4D97-AF65-F5344CB8AC3E}">
-        <p14:creationId xmlns:p14="http://schemas.microsoft.com/office/powerpoint/2010/main" val="3096231481"/>
-      </p:ext>
-    </p:extLst>
-  </p:cSld>
-  <p:clrMapOvr>
-    <a:masterClrMapping/>
-  </p:clrMapOvr>
-</p:sld>
-</file>
-
-<file path=ppt/slides/slide27.xml><?xml version="1.0" encoding="utf-8"?>
-<p:sld xmlns:a="http://schemas.openxmlformats.org/drawingml/2006/main" xmlns:r="http://schemas.openxmlformats.org/officeDocument/2006/relationships" xmlns:p="http://schemas.openxmlformats.org/presentationml/2006/main">
-  <p:cSld>
-    <p:spTree>
-      <p:nvGrpSpPr>
-        <p:cNvPr id="1" name=""/>
-        <p:cNvGrpSpPr/>
-        <p:nvPr/>
-      </p:nvGrpSpPr>
-      <p:grpSpPr>
-        <a:xfrm>
-          <a:off x="0" y="0"/>
-          <a:ext cx="0" cy="0"/>
-          <a:chOff x="0" y="0"/>
-          <a:chExt cx="0" cy="0"/>
-        </a:xfrm>
-      </p:grpSpPr>
-      <p:pic>
-        <p:nvPicPr>
-          <p:cNvPr id="5" name="그림 4">
-            <a:extLst>
-              <a:ext uri="{FF2B5EF4-FFF2-40B4-BE49-F238E27FC236}">
-                <a16:creationId xmlns:a16="http://schemas.microsoft.com/office/drawing/2014/main" id="{3F66395F-A824-4B30-8A15-16DA42F47BDD}"/>
-              </a:ext>
-            </a:extLst>
-          </p:cNvPr>
-          <p:cNvPicPr>
-            <a:picLocks noChangeAspect="1"/>
-          </p:cNvPicPr>
-          <p:nvPr/>
-        </p:nvPicPr>
-        <p:blipFill>
-          <a:blip r:embed="rId2"/>
-          <a:stretch>
-            <a:fillRect/>
-          </a:stretch>
-        </p:blipFill>
-        <p:spPr>
-          <a:xfrm>
-            <a:off x="1333479" y="748793"/>
-            <a:ext cx="9525042" cy="5360413"/>
-          </a:xfrm>
-          <a:prstGeom prst="rect">
-            <a:avLst/>
-          </a:prstGeom>
-        </p:spPr>
-      </p:pic>
-      <p:pic>
-        <p:nvPicPr>
-          <p:cNvPr id="6" name="그림 5">
-            <a:extLst>
-              <a:ext uri="{FF2B5EF4-FFF2-40B4-BE49-F238E27FC236}">
-                <a16:creationId xmlns:a16="http://schemas.microsoft.com/office/drawing/2014/main" id="{86B5D479-DECB-4BED-971C-DC66DDB5A9EE}"/>
-              </a:ext>
-            </a:extLst>
-          </p:cNvPr>
-          <p:cNvPicPr>
-            <a:picLocks noChangeAspect="1"/>
-          </p:cNvPicPr>
-          <p:nvPr/>
-        </p:nvPicPr>
-        <p:blipFill>
-          <a:blip r:embed="rId3"/>
-          <a:stretch>
-            <a:fillRect/>
-          </a:stretch>
-        </p:blipFill>
-        <p:spPr>
-          <a:xfrm>
-            <a:off x="7590524" y="5179847"/>
-            <a:ext cx="4008585" cy="1171183"/>
-          </a:xfrm>
-          <a:prstGeom prst="rect">
-            <a:avLst/>
-          </a:prstGeom>
-        </p:spPr>
-      </p:pic>
-    </p:spTree>
-    <p:extLst>
-      <p:ext uri="{BB962C8B-B14F-4D97-AF65-F5344CB8AC3E}">
-        <p14:creationId xmlns:p14="http://schemas.microsoft.com/office/powerpoint/2010/main" val="2242863195"/>
-      </p:ext>
-    </p:extLst>
-  </p:cSld>
-  <p:clrMapOvr>
-    <a:masterClrMapping/>
-  </p:clrMapOvr>
-</p:sld>
-</file>
-
-<file path=ppt/slides/slide28.xml><?xml version="1.0" encoding="utf-8"?>
-<p:sld xmlns:a="http://schemas.openxmlformats.org/drawingml/2006/main" xmlns:r="http://schemas.openxmlformats.org/officeDocument/2006/relationships" xmlns:p="http://schemas.openxmlformats.org/presentationml/2006/main">
-  <p:cSld>
-    <p:spTree>
-      <p:nvGrpSpPr>
-        <p:cNvPr id="1" name=""/>
-        <p:cNvGrpSpPr/>
-        <p:nvPr/>
-      </p:nvGrpSpPr>
-      <p:grpSpPr>
-        <a:xfrm>
-          <a:off x="0" y="0"/>
-          <a:ext cx="0" cy="0"/>
-          <a:chOff x="0" y="0"/>
-          <a:chExt cx="0" cy="0"/>
-        </a:xfrm>
-      </p:grpSpPr>
-      <p:pic>
-        <p:nvPicPr>
-          <p:cNvPr id="3" name="그림 2">
-            <a:extLst>
-              <a:ext uri="{FF2B5EF4-FFF2-40B4-BE49-F238E27FC236}">
-                <a16:creationId xmlns:a16="http://schemas.microsoft.com/office/drawing/2014/main" id="{EE2F40F5-5537-4D90-B73A-CF020A041929}"/>
-              </a:ext>
-            </a:extLst>
-          </p:cNvPr>
-          <p:cNvPicPr>
-            <a:picLocks noChangeAspect="1"/>
-          </p:cNvPicPr>
-          <p:nvPr/>
-        </p:nvPicPr>
-        <p:blipFill>
-          <a:blip r:embed="rId2"/>
-          <a:stretch>
-            <a:fillRect/>
-          </a:stretch>
-        </p:blipFill>
-        <p:spPr>
-          <a:xfrm>
-            <a:off x="80608" y="2030047"/>
-            <a:ext cx="12030784" cy="2797905"/>
-          </a:xfrm>
-          <a:prstGeom prst="rect">
-            <a:avLst/>
-          </a:prstGeom>
-        </p:spPr>
-      </p:pic>
-    </p:spTree>
-    <p:extLst>
-      <p:ext uri="{BB962C8B-B14F-4D97-AF65-F5344CB8AC3E}">
-        <p14:creationId xmlns:p14="http://schemas.microsoft.com/office/powerpoint/2010/main" val="4179543665"/>
-      </p:ext>
-    </p:extLst>
-  </p:cSld>
-  <p:clrMapOvr>
-    <a:masterClrMapping/>
-  </p:clrMapOvr>
-</p:sld>
-</file>
-
-<file path=ppt/slides/slide29.xml><?xml version="1.0" encoding="utf-8"?>
-<p:sld xmlns:a="http://schemas.openxmlformats.org/drawingml/2006/main" xmlns:r="http://schemas.openxmlformats.org/officeDocument/2006/relationships" xmlns:p="http://schemas.openxmlformats.org/presentationml/2006/main">
-  <p:cSld>
-    <p:spTree>
-      <p:nvGrpSpPr>
-        <p:cNvPr id="1" name=""/>
-        <p:cNvGrpSpPr/>
-        <p:nvPr/>
-      </p:nvGrpSpPr>
-      <p:grpSpPr>
-        <a:xfrm>
-          <a:off x="0" y="0"/>
-          <a:ext cx="0" cy="0"/>
-          <a:chOff x="0" y="0"/>
-          <a:chExt cx="0" cy="0"/>
-        </a:xfrm>
-      </p:grpSpPr>
-      <p:pic>
-        <p:nvPicPr>
-          <p:cNvPr id="3" name="그림 2">
-            <a:extLst>
-              <a:ext uri="{FF2B5EF4-FFF2-40B4-BE49-F238E27FC236}">
-                <a16:creationId xmlns:a16="http://schemas.microsoft.com/office/drawing/2014/main" id="{A5F7D7AE-6C71-49C4-9FEB-F85897FA3368}"/>
-              </a:ext>
-            </a:extLst>
-          </p:cNvPr>
-          <p:cNvPicPr>
-            <a:picLocks noChangeAspect="1"/>
-          </p:cNvPicPr>
-          <p:nvPr/>
-        </p:nvPicPr>
-        <p:blipFill>
-          <a:blip r:embed="rId2"/>
-          <a:stretch>
-            <a:fillRect/>
-          </a:stretch>
-        </p:blipFill>
-        <p:spPr>
-          <a:xfrm>
-            <a:off x="3423864" y="1018838"/>
-            <a:ext cx="5344271" cy="4820323"/>
-          </a:xfrm>
-          <a:prstGeom prst="rect">
-            <a:avLst/>
-          </a:prstGeom>
-        </p:spPr>
-      </p:pic>
-    </p:spTree>
-    <p:extLst>
-      <p:ext uri="{BB962C8B-B14F-4D97-AF65-F5344CB8AC3E}">
-        <p14:creationId xmlns:p14="http://schemas.microsoft.com/office/powerpoint/2010/main" val="1640651310"/>
       </p:ext>
     </p:extLst>
   </p:cSld>

</xml_diff>